<commit_message>
moduler learning initial commit
</commit_message>
<xml_diff>
--- a/envs/maps/map.pptx
+++ b/envs/maps/map.pptx
@@ -5,10 +5,10 @@
     <p:sldMasterId id="2147483648" r:id="rId1"/>
   </p:sldMasterIdLst>
   <p:notesMasterIdLst>
-    <p:notesMasterId r:id="rId10"/>
+    <p:notesMasterId r:id="rId11"/>
   </p:notesMasterIdLst>
   <p:handoutMasterIdLst>
-    <p:handoutMasterId r:id="rId11"/>
+    <p:handoutMasterId r:id="rId12"/>
   </p:handoutMasterIdLst>
   <p:sldIdLst>
     <p:sldId id="256" r:id="rId3"/>
@@ -18,6 +18,7 @@
     <p:sldId id="267" r:id="rId7"/>
     <p:sldId id="268" r:id="rId8"/>
     <p:sldId id="269" r:id="rId9"/>
+    <p:sldId id="270" r:id="rId10"/>
   </p:sldIdLst>
   <p:sldSz cx="12192000" cy="6858000"/>
   <p:notesSz cx="7103745" cy="10234295"/>
@@ -6184,6 +6185,24 @@
           </a:p>
         </p:txBody>
       </p:sp>
+    </p:spTree>
+  </p:cSld>
+  <p:clrMapOvr>
+    <a:masterClrMapping/>
+  </p:clrMapOvr>
+</p:sld>
+</file>
+
+<file path=ppt/slides/slide8.xml><?xml version="1.0" encoding="utf-8"?>
+<p:sld xmlns:a="http://schemas.openxmlformats.org/drawingml/2006/main" xmlns:r="http://schemas.openxmlformats.org/officeDocument/2006/relationships" xmlns:p="http://schemas.openxmlformats.org/presentationml/2006/main">
+  <p:cSld>
+    <p:spTree>
+      <p:nvGrpSpPr>
+        <p:cNvPr id="1" name=""/>
+        <p:cNvGrpSpPr/>
+        <p:nvPr/>
+      </p:nvGrpSpPr>
+      <p:grpSpPr/>
     </p:spTree>
   </p:cSld>
   <p:clrMapOvr>

</xml_diff>